<commit_message>
Agregar taller de interfaz a archivos del proyecto
</commit_message>
<xml_diff>
--- a/.Otros Archivos/Capturas de Procesos/Manual de Usuario/CapturasManualDeUsuario.pptx
+++ b/.Otros Archivos/Capturas de Procesos/Manual de Usuario/CapturasManualDeUsuario.pptx
@@ -132,6 +132,11 @@
       </a:defRPr>
     </a:lvl9pPr>
   </p:defaultTextStyle>
+  <p:extLst>
+    <p:ext uri="{EFAFB233-063F-42B5-8137-9DF3F51BA10A}">
+      <p15:sldGuideLst xmlns:p15="http://schemas.microsoft.com/office/powerpoint/2012/main"/>
+    </p:ext>
+  </p:extLst>
 </p:presentation>
 </file>
 
@@ -284,7 +289,7 @@
           <a:p>
             <a:fld id="{D332194C-11BD-4FE8-B454-19F8D0ED2D44}" type="datetimeFigureOut">
               <a:rPr lang="es-CR" smtClean="0"/>
-              <a:t>29/6/2020</a:t>
+              <a:t>1/7/2020</a:t>
             </a:fld>
             <a:endParaRPr lang="es-CR"/>
           </a:p>
@@ -484,7 +489,7 @@
           <a:p>
             <a:fld id="{D332194C-11BD-4FE8-B454-19F8D0ED2D44}" type="datetimeFigureOut">
               <a:rPr lang="es-CR" smtClean="0"/>
-              <a:t>29/6/2020</a:t>
+              <a:t>1/7/2020</a:t>
             </a:fld>
             <a:endParaRPr lang="es-CR"/>
           </a:p>
@@ -694,7 +699,7 @@
           <a:p>
             <a:fld id="{D332194C-11BD-4FE8-B454-19F8D0ED2D44}" type="datetimeFigureOut">
               <a:rPr lang="es-CR" smtClean="0"/>
-              <a:t>29/6/2020</a:t>
+              <a:t>1/7/2020</a:t>
             </a:fld>
             <a:endParaRPr lang="es-CR"/>
           </a:p>
@@ -894,7 +899,7 @@
           <a:p>
             <a:fld id="{D332194C-11BD-4FE8-B454-19F8D0ED2D44}" type="datetimeFigureOut">
               <a:rPr lang="es-CR" smtClean="0"/>
-              <a:t>29/6/2020</a:t>
+              <a:t>1/7/2020</a:t>
             </a:fld>
             <a:endParaRPr lang="es-CR"/>
           </a:p>
@@ -1170,7 +1175,7 @@
           <a:p>
             <a:fld id="{D332194C-11BD-4FE8-B454-19F8D0ED2D44}" type="datetimeFigureOut">
               <a:rPr lang="es-CR" smtClean="0"/>
-              <a:t>29/6/2020</a:t>
+              <a:t>1/7/2020</a:t>
             </a:fld>
             <a:endParaRPr lang="es-CR"/>
           </a:p>
@@ -1438,7 +1443,7 @@
           <a:p>
             <a:fld id="{D332194C-11BD-4FE8-B454-19F8D0ED2D44}" type="datetimeFigureOut">
               <a:rPr lang="es-CR" smtClean="0"/>
-              <a:t>29/6/2020</a:t>
+              <a:t>1/7/2020</a:t>
             </a:fld>
             <a:endParaRPr lang="es-CR"/>
           </a:p>
@@ -1853,7 +1858,7 @@
           <a:p>
             <a:fld id="{D332194C-11BD-4FE8-B454-19F8D0ED2D44}" type="datetimeFigureOut">
               <a:rPr lang="es-CR" smtClean="0"/>
-              <a:t>29/6/2020</a:t>
+              <a:t>1/7/2020</a:t>
             </a:fld>
             <a:endParaRPr lang="es-CR"/>
           </a:p>
@@ -1995,7 +2000,7 @@
           <a:p>
             <a:fld id="{D332194C-11BD-4FE8-B454-19F8D0ED2D44}" type="datetimeFigureOut">
               <a:rPr lang="es-CR" smtClean="0"/>
-              <a:t>29/6/2020</a:t>
+              <a:t>1/7/2020</a:t>
             </a:fld>
             <a:endParaRPr lang="es-CR"/>
           </a:p>
@@ -2108,7 +2113,7 @@
           <a:p>
             <a:fld id="{D332194C-11BD-4FE8-B454-19F8D0ED2D44}" type="datetimeFigureOut">
               <a:rPr lang="es-CR" smtClean="0"/>
-              <a:t>29/6/2020</a:t>
+              <a:t>1/7/2020</a:t>
             </a:fld>
             <a:endParaRPr lang="es-CR"/>
           </a:p>
@@ -2421,7 +2426,7 @@
           <a:p>
             <a:fld id="{D332194C-11BD-4FE8-B454-19F8D0ED2D44}" type="datetimeFigureOut">
               <a:rPr lang="es-CR" smtClean="0"/>
-              <a:t>29/6/2020</a:t>
+              <a:t>1/7/2020</a:t>
             </a:fld>
             <a:endParaRPr lang="es-CR"/>
           </a:p>
@@ -2710,7 +2715,7 @@
           <a:p>
             <a:fld id="{D332194C-11BD-4FE8-B454-19F8D0ED2D44}" type="datetimeFigureOut">
               <a:rPr lang="es-CR" smtClean="0"/>
-              <a:t>29/6/2020</a:t>
+              <a:t>1/7/2020</a:t>
             </a:fld>
             <a:endParaRPr lang="es-CR"/>
           </a:p>
@@ -2953,7 +2958,7 @@
           <a:p>
             <a:fld id="{D332194C-11BD-4FE8-B454-19F8D0ED2D44}" type="datetimeFigureOut">
               <a:rPr lang="es-CR" smtClean="0"/>
-              <a:t>29/6/2020</a:t>
+              <a:t>1/7/2020</a:t>
             </a:fld>
             <a:endParaRPr lang="es-CR"/>
           </a:p>
@@ -3418,13 +3423,13 @@
   <p:clrMapOvr>
     <a:masterClrMapping/>
   </p:clrMapOvr>
-  <mc:AlternateContent xmlns:mc="http://schemas.openxmlformats.org/markup-compatibility/2006">
-    <mc:Choice xmlns:p159="http://schemas.microsoft.com/office/powerpoint/2015/09/main" Requires="p159">
+  <mc:AlternateContent xmlns:mc="http://schemas.openxmlformats.org/markup-compatibility/2006" xmlns:p159="http://schemas.microsoft.com/office/powerpoint/2015/09/main">
+    <mc:Choice Requires="p159">
       <p:transition xmlns:p14="http://schemas.microsoft.com/office/powerpoint/2010/main" spd="slow" p14:dur="2000">
         <p159:morph option="byObject"/>
       </p:transition>
     </mc:Choice>
-    <mc:Fallback>
+    <mc:Fallback xmlns="">
       <p:transition spd="slow">
         <p:fade/>
       </p:transition>
@@ -3538,6 +3543,58 @@
           </a:prstGeom>
         </p:spPr>
       </p:pic>
+      <p:sp>
+        <p:nvSpPr>
+          <p:cNvPr id="3" name="Rectangle 2">
+            <a:extLst>
+              <a:ext uri="{FF2B5EF4-FFF2-40B4-BE49-F238E27FC236}">
+                <a16:creationId xmlns:a16="http://schemas.microsoft.com/office/drawing/2014/main" id="{070005D1-0540-4C8E-9C75-5423B68245D5}"/>
+              </a:ext>
+            </a:extLst>
+          </p:cNvPr>
+          <p:cNvSpPr/>
+          <p:nvPr/>
+        </p:nvSpPr>
+        <p:spPr>
+          <a:xfrm>
+            <a:off x="7282179" y="1174913"/>
+            <a:ext cx="2119273" cy="4435773"/>
+          </a:xfrm>
+          <a:prstGeom prst="rect">
+            <a:avLst/>
+          </a:prstGeom>
+          <a:noFill/>
+          <a:ln w="19050">
+            <a:solidFill>
+              <a:srgbClr val="FF0000"/>
+            </a:solidFill>
+          </a:ln>
+        </p:spPr>
+        <p:style>
+          <a:lnRef idx="2">
+            <a:schemeClr val="accent1">
+              <a:shade val="50000"/>
+            </a:schemeClr>
+          </a:lnRef>
+          <a:fillRef idx="1">
+            <a:schemeClr val="accent1"/>
+          </a:fillRef>
+          <a:effectRef idx="0">
+            <a:schemeClr val="accent1"/>
+          </a:effectRef>
+          <a:fontRef idx="minor">
+            <a:schemeClr val="lt1"/>
+          </a:fontRef>
+        </p:style>
+        <p:txBody>
+          <a:bodyPr rtlCol="0" anchor="ctr"/>
+          <a:lstStyle/>
+          <a:p>
+            <a:pPr algn="ctr"/>
+            <a:endParaRPr lang="es-CR"/>
+          </a:p>
+        </p:txBody>
+      </p:sp>
     </p:spTree>
     <p:extLst>
       <p:ext uri="{BB962C8B-B14F-4D97-AF65-F5344CB8AC3E}">
@@ -3626,6 +3683,110 @@
           </a:prstGeom>
         </p:spPr>
       </p:pic>
+      <p:sp>
+        <p:nvSpPr>
+          <p:cNvPr id="5" name="Rectangle 4">
+            <a:extLst>
+              <a:ext uri="{FF2B5EF4-FFF2-40B4-BE49-F238E27FC236}">
+                <a16:creationId xmlns:a16="http://schemas.microsoft.com/office/drawing/2014/main" id="{6EA3C2CA-2186-4D66-BC73-584A4B135733}"/>
+              </a:ext>
+            </a:extLst>
+          </p:cNvPr>
+          <p:cNvSpPr/>
+          <p:nvPr/>
+        </p:nvSpPr>
+        <p:spPr>
+          <a:xfrm>
+            <a:off x="6120406" y="5726098"/>
+            <a:ext cx="1097140" cy="437195"/>
+          </a:xfrm>
+          <a:prstGeom prst="rect">
+            <a:avLst/>
+          </a:prstGeom>
+          <a:noFill/>
+          <a:ln w="19050">
+            <a:solidFill>
+              <a:srgbClr val="FF0000"/>
+            </a:solidFill>
+          </a:ln>
+        </p:spPr>
+        <p:style>
+          <a:lnRef idx="2">
+            <a:schemeClr val="accent1">
+              <a:shade val="50000"/>
+            </a:schemeClr>
+          </a:lnRef>
+          <a:fillRef idx="1">
+            <a:schemeClr val="accent1"/>
+          </a:fillRef>
+          <a:effectRef idx="0">
+            <a:schemeClr val="accent1"/>
+          </a:effectRef>
+          <a:fontRef idx="minor">
+            <a:schemeClr val="lt1"/>
+          </a:fontRef>
+        </p:style>
+        <p:txBody>
+          <a:bodyPr rtlCol="0" anchor="ctr"/>
+          <a:lstStyle/>
+          <a:p>
+            <a:pPr algn="ctr"/>
+            <a:endParaRPr lang="es-CR"/>
+          </a:p>
+        </p:txBody>
+      </p:sp>
+      <p:sp>
+        <p:nvSpPr>
+          <p:cNvPr id="6" name="Rectangle 5">
+            <a:extLst>
+              <a:ext uri="{FF2B5EF4-FFF2-40B4-BE49-F238E27FC236}">
+                <a16:creationId xmlns:a16="http://schemas.microsoft.com/office/drawing/2014/main" id="{12E94241-4406-4FB4-A741-43B307101F11}"/>
+              </a:ext>
+            </a:extLst>
+          </p:cNvPr>
+          <p:cNvSpPr/>
+          <p:nvPr/>
+        </p:nvSpPr>
+        <p:spPr>
+          <a:xfrm>
+            <a:off x="1713391" y="1189607"/>
+            <a:ext cx="5584054" cy="4429958"/>
+          </a:xfrm>
+          <a:prstGeom prst="rect">
+            <a:avLst/>
+          </a:prstGeom>
+          <a:noFill/>
+          <a:ln w="19050">
+            <a:solidFill>
+              <a:srgbClr val="FF0000"/>
+            </a:solidFill>
+          </a:ln>
+        </p:spPr>
+        <p:style>
+          <a:lnRef idx="2">
+            <a:schemeClr val="accent1">
+              <a:shade val="50000"/>
+            </a:schemeClr>
+          </a:lnRef>
+          <a:fillRef idx="1">
+            <a:schemeClr val="accent1"/>
+          </a:fillRef>
+          <a:effectRef idx="0">
+            <a:schemeClr val="accent1"/>
+          </a:effectRef>
+          <a:fontRef idx="minor">
+            <a:schemeClr val="lt1"/>
+          </a:fontRef>
+        </p:style>
+        <p:txBody>
+          <a:bodyPr rtlCol="0" anchor="ctr"/>
+          <a:lstStyle/>
+          <a:p>
+            <a:pPr algn="ctr"/>
+            <a:endParaRPr lang="es-CR"/>
+          </a:p>
+        </p:txBody>
+      </p:sp>
     </p:spTree>
     <p:extLst>
       <p:ext uri="{BB962C8B-B14F-4D97-AF65-F5344CB8AC3E}">
@@ -3723,36 +3884,154 @@
           <a:chExt cx="0" cy="0"/>
         </a:xfrm>
       </p:grpSpPr>
-      <p:pic>
-        <p:nvPicPr>
-          <p:cNvPr id="3" name="Picture 2">
-            <a:extLst>
-              <a:ext uri="{FF2B5EF4-FFF2-40B4-BE49-F238E27FC236}">
-                <a16:creationId xmlns:a16="http://schemas.microsoft.com/office/drawing/2014/main" id="{43470253-9699-4500-A3FD-E300EB99B90F}"/>
-              </a:ext>
-            </a:extLst>
-          </p:cNvPr>
-          <p:cNvPicPr>
-            <a:picLocks noChangeAspect="1"/>
-          </p:cNvPicPr>
+      <p:grpSp>
+        <p:nvGrpSpPr>
+          <p:cNvPr id="9" name="Group 8">
+            <a:extLst>
+              <a:ext uri="{FF2B5EF4-FFF2-40B4-BE49-F238E27FC236}">
+                <a16:creationId xmlns:a16="http://schemas.microsoft.com/office/drawing/2014/main" id="{E8ED400F-B355-4EFC-97C2-2F497CBE72CE}"/>
+              </a:ext>
+            </a:extLst>
+          </p:cNvPr>
+          <p:cNvGrpSpPr/>
           <p:nvPr/>
-        </p:nvPicPr>
-        <p:blipFill>
-          <a:blip r:embed="rId2"/>
-          <a:stretch>
-            <a:fillRect/>
-          </a:stretch>
-        </p:blipFill>
-        <p:spPr>
+        </p:nvGrpSpPr>
+        <p:grpSpPr>
           <a:xfrm>
             <a:off x="1594809" y="680654"/>
             <a:ext cx="9002381" cy="5496692"/>
+            <a:chOff x="1594809" y="680654"/>
+            <a:chExt cx="9002381" cy="5496692"/>
           </a:xfrm>
-          <a:prstGeom prst="rect">
-            <a:avLst/>
-          </a:prstGeom>
-        </p:spPr>
-      </p:pic>
+        </p:grpSpPr>
+        <p:pic>
+          <p:nvPicPr>
+            <p:cNvPr id="3" name="Picture 2">
+              <a:extLst>
+                <a:ext uri="{FF2B5EF4-FFF2-40B4-BE49-F238E27FC236}">
+                  <a16:creationId xmlns:a16="http://schemas.microsoft.com/office/drawing/2014/main" id="{43470253-9699-4500-A3FD-E300EB99B90F}"/>
+                </a:ext>
+              </a:extLst>
+            </p:cNvPr>
+            <p:cNvPicPr>
+              <a:picLocks noChangeAspect="1"/>
+            </p:cNvPicPr>
+            <p:nvPr/>
+          </p:nvPicPr>
+          <p:blipFill>
+            <a:blip r:embed="rId2"/>
+            <a:stretch>
+              <a:fillRect/>
+            </a:stretch>
+          </p:blipFill>
+          <p:spPr>
+            <a:xfrm>
+              <a:off x="1594809" y="680654"/>
+              <a:ext cx="9002381" cy="5496692"/>
+            </a:xfrm>
+            <a:prstGeom prst="rect">
+              <a:avLst/>
+            </a:prstGeom>
+          </p:spPr>
+        </p:pic>
+        <p:sp>
+          <p:nvSpPr>
+            <p:cNvPr id="4" name="Rectangle 3">
+              <a:extLst>
+                <a:ext uri="{FF2B5EF4-FFF2-40B4-BE49-F238E27FC236}">
+                  <a16:creationId xmlns:a16="http://schemas.microsoft.com/office/drawing/2014/main" id="{BCD67505-D38C-4392-981C-2800245F41BD}"/>
+                </a:ext>
+              </a:extLst>
+            </p:cNvPr>
+            <p:cNvSpPr/>
+            <p:nvPr/>
+          </p:nvSpPr>
+          <p:spPr>
+            <a:xfrm>
+              <a:off x="8569442" y="5681708"/>
+              <a:ext cx="689968" cy="378781"/>
+            </a:xfrm>
+            <a:prstGeom prst="rect">
+              <a:avLst/>
+            </a:prstGeom>
+            <a:noFill/>
+            <a:ln w="19050">
+              <a:solidFill>
+                <a:srgbClr val="FF0000"/>
+              </a:solidFill>
+            </a:ln>
+          </p:spPr>
+          <p:style>
+            <a:lnRef idx="2">
+              <a:schemeClr val="accent1">
+                <a:shade val="50000"/>
+              </a:schemeClr>
+            </a:lnRef>
+            <a:fillRef idx="1">
+              <a:schemeClr val="accent1"/>
+            </a:fillRef>
+            <a:effectRef idx="0">
+              <a:schemeClr val="accent1"/>
+            </a:effectRef>
+            <a:fontRef idx="minor">
+              <a:schemeClr val="lt1"/>
+            </a:fontRef>
+          </p:style>
+          <p:txBody>
+            <a:bodyPr rtlCol="0" anchor="ctr"/>
+            <a:lstStyle/>
+            <a:p>
+              <a:pPr algn="ctr"/>
+              <a:endParaRPr lang="es-CR"/>
+            </a:p>
+          </p:txBody>
+        </p:sp>
+        <p:cxnSp>
+          <p:nvCxnSpPr>
+            <p:cNvPr id="5" name="Straight Arrow Connector 4">
+              <a:extLst>
+                <a:ext uri="{FF2B5EF4-FFF2-40B4-BE49-F238E27FC236}">
+                  <a16:creationId xmlns:a16="http://schemas.microsoft.com/office/drawing/2014/main" id="{ABF8E72C-86E8-46CE-AEDB-132D6080240A}"/>
+                </a:ext>
+              </a:extLst>
+            </p:cNvPr>
+            <p:cNvCxnSpPr>
+              <a:cxnSpLocks/>
+              <a:stCxn id="4" idx="0"/>
+            </p:cNvCxnSpPr>
+            <p:nvPr/>
+          </p:nvCxnSpPr>
+          <p:spPr>
+            <a:xfrm flipH="1" flipV="1">
+              <a:off x="7599285" y="4421080"/>
+              <a:ext cx="1315141" cy="1260628"/>
+            </a:xfrm>
+            <a:prstGeom prst="straightConnector1">
+              <a:avLst/>
+            </a:prstGeom>
+            <a:ln w="28575">
+              <a:solidFill>
+                <a:srgbClr val="FF0000"/>
+              </a:solidFill>
+              <a:tailEnd type="triangle"/>
+            </a:ln>
+          </p:spPr>
+          <p:style>
+            <a:lnRef idx="1">
+              <a:schemeClr val="accent1"/>
+            </a:lnRef>
+            <a:fillRef idx="0">
+              <a:schemeClr val="accent1"/>
+            </a:fillRef>
+            <a:effectRef idx="0">
+              <a:schemeClr val="accent1"/>
+            </a:effectRef>
+            <a:fontRef idx="minor">
+              <a:schemeClr val="tx1"/>
+            </a:fontRef>
+          </p:style>
+        </p:cxnSp>
+      </p:grpSp>
     </p:spTree>
     <p:extLst>
       <p:ext uri="{BB962C8B-B14F-4D97-AF65-F5344CB8AC3E}">
@@ -3783,35 +4062,108 @@
           <a:chExt cx="0" cy="0"/>
         </a:xfrm>
       </p:grpSpPr>
-      <p:pic>
-        <p:nvPicPr>
-          <p:cNvPr id="2" name="Picture 1">
-            <a:extLst>
-              <a:ext uri="{FF2B5EF4-FFF2-40B4-BE49-F238E27FC236}">
-                <a16:creationId xmlns:a16="http://schemas.microsoft.com/office/drawing/2014/main" id="{0C43D35D-B60F-4128-A188-43A63F3FF69A}"/>
-              </a:ext>
-            </a:extLst>
-          </p:cNvPr>
-          <p:cNvPicPr>
-            <a:picLocks noChangeAspect="1"/>
-          </p:cNvPicPr>
+      <p:grpSp>
+        <p:nvGrpSpPr>
+          <p:cNvPr id="4" name="Group 3">
+            <a:extLst>
+              <a:ext uri="{FF2B5EF4-FFF2-40B4-BE49-F238E27FC236}">
+                <a16:creationId xmlns:a16="http://schemas.microsoft.com/office/drawing/2014/main" id="{36241065-B3FA-4068-87E3-8C1BD979DB75}"/>
+              </a:ext>
+            </a:extLst>
+          </p:cNvPr>
+          <p:cNvGrpSpPr/>
           <p:nvPr/>
-        </p:nvPicPr>
-        <p:blipFill rotWithShape="1">
-          <a:blip r:embed="rId2"/>
-          <a:srcRect l="584" t="927" r="717"/>
-          <a:stretch/>
-        </p:blipFill>
-        <p:spPr>
+        </p:nvGrpSpPr>
+        <p:grpSpPr>
           <a:xfrm>
             <a:off x="1556704" y="712922"/>
             <a:ext cx="9013140" cy="5483476"/>
+            <a:chOff x="1556704" y="712922"/>
+            <a:chExt cx="9013140" cy="5483476"/>
           </a:xfrm>
-          <a:prstGeom prst="rect">
-            <a:avLst/>
-          </a:prstGeom>
-        </p:spPr>
-      </p:pic>
+        </p:grpSpPr>
+        <p:pic>
+          <p:nvPicPr>
+            <p:cNvPr id="2" name="Picture 1">
+              <a:extLst>
+                <a:ext uri="{FF2B5EF4-FFF2-40B4-BE49-F238E27FC236}">
+                  <a16:creationId xmlns:a16="http://schemas.microsoft.com/office/drawing/2014/main" id="{0C43D35D-B60F-4128-A188-43A63F3FF69A}"/>
+                </a:ext>
+              </a:extLst>
+            </p:cNvPr>
+            <p:cNvPicPr>
+              <a:picLocks noChangeAspect="1"/>
+            </p:cNvPicPr>
+            <p:nvPr/>
+          </p:nvPicPr>
+          <p:blipFill rotWithShape="1">
+            <a:blip r:embed="rId2"/>
+            <a:srcRect l="584" t="927" r="717"/>
+            <a:stretch/>
+          </p:blipFill>
+          <p:spPr>
+            <a:xfrm>
+              <a:off x="1556704" y="712922"/>
+              <a:ext cx="9013140" cy="5483476"/>
+            </a:xfrm>
+            <a:prstGeom prst="rect">
+              <a:avLst/>
+            </a:prstGeom>
+          </p:spPr>
+        </p:pic>
+        <p:sp>
+          <p:nvSpPr>
+            <p:cNvPr id="3" name="Rectangle 2">
+              <a:extLst>
+                <a:ext uri="{FF2B5EF4-FFF2-40B4-BE49-F238E27FC236}">
+                  <a16:creationId xmlns:a16="http://schemas.microsoft.com/office/drawing/2014/main" id="{BDD360D4-C5DB-4D07-AC54-530938476783}"/>
+                </a:ext>
+              </a:extLst>
+            </p:cNvPr>
+            <p:cNvSpPr/>
+            <p:nvPr/>
+          </p:nvSpPr>
+          <p:spPr>
+            <a:xfrm>
+              <a:off x="7264423" y="1145219"/>
+              <a:ext cx="2119273" cy="4518734"/>
+            </a:xfrm>
+            <a:prstGeom prst="rect">
+              <a:avLst/>
+            </a:prstGeom>
+            <a:noFill/>
+            <a:ln w="19050">
+              <a:solidFill>
+                <a:srgbClr val="FF0000"/>
+              </a:solidFill>
+            </a:ln>
+          </p:spPr>
+          <p:style>
+            <a:lnRef idx="2">
+              <a:schemeClr val="accent1">
+                <a:shade val="50000"/>
+              </a:schemeClr>
+            </a:lnRef>
+            <a:fillRef idx="1">
+              <a:schemeClr val="accent1"/>
+            </a:fillRef>
+            <a:effectRef idx="0">
+              <a:schemeClr val="accent1"/>
+            </a:effectRef>
+            <a:fontRef idx="minor">
+              <a:schemeClr val="lt1"/>
+            </a:fontRef>
+          </p:style>
+          <p:txBody>
+            <a:bodyPr rtlCol="0" anchor="ctr"/>
+            <a:lstStyle/>
+            <a:p>
+              <a:pPr algn="ctr"/>
+              <a:endParaRPr lang="es-CR"/>
+            </a:p>
+          </p:txBody>
+        </p:sp>
+      </p:grpSp>
     </p:spTree>
     <p:extLst>
       <p:ext uri="{BB962C8B-B14F-4D97-AF65-F5344CB8AC3E}">
@@ -3901,36 +4253,153 @@
           <a:chExt cx="0" cy="0"/>
         </a:xfrm>
       </p:grpSpPr>
-      <p:pic>
-        <p:nvPicPr>
-          <p:cNvPr id="2" name="Picture 1">
-            <a:extLst>
-              <a:ext uri="{FF2B5EF4-FFF2-40B4-BE49-F238E27FC236}">
-                <a16:creationId xmlns:a16="http://schemas.microsoft.com/office/drawing/2014/main" id="{A7DC02A3-3804-4073-8587-691BACBEE7B7}"/>
-              </a:ext>
-            </a:extLst>
-          </p:cNvPr>
-          <p:cNvPicPr>
-            <a:picLocks noChangeAspect="1"/>
-          </p:cNvPicPr>
+      <p:grpSp>
+        <p:nvGrpSpPr>
+          <p:cNvPr id="6" name="Group 5">
+            <a:extLst>
+              <a:ext uri="{FF2B5EF4-FFF2-40B4-BE49-F238E27FC236}">
+                <a16:creationId xmlns:a16="http://schemas.microsoft.com/office/drawing/2014/main" id="{3B67C08B-6517-4FA7-B0F1-DD9FEB0E7ECF}"/>
+              </a:ext>
+            </a:extLst>
+          </p:cNvPr>
+          <p:cNvGrpSpPr/>
           <p:nvPr/>
-        </p:nvPicPr>
-        <p:blipFill>
-          <a:blip r:embed="rId2"/>
-          <a:stretch>
-            <a:fillRect/>
-          </a:stretch>
-        </p:blipFill>
-        <p:spPr>
+        </p:nvGrpSpPr>
+        <p:grpSpPr>
           <a:xfrm>
-            <a:off x="1599572" y="680654"/>
+            <a:off x="1599572" y="458712"/>
             <a:ext cx="8992855" cy="5496692"/>
+            <a:chOff x="1599572" y="458712"/>
+            <a:chExt cx="8992855" cy="5496692"/>
           </a:xfrm>
-          <a:prstGeom prst="rect">
-            <a:avLst/>
-          </a:prstGeom>
-        </p:spPr>
-      </p:pic>
+        </p:grpSpPr>
+        <p:pic>
+          <p:nvPicPr>
+            <p:cNvPr id="2" name="Picture 1">
+              <a:extLst>
+                <a:ext uri="{FF2B5EF4-FFF2-40B4-BE49-F238E27FC236}">
+                  <a16:creationId xmlns:a16="http://schemas.microsoft.com/office/drawing/2014/main" id="{A7DC02A3-3804-4073-8587-691BACBEE7B7}"/>
+                </a:ext>
+              </a:extLst>
+            </p:cNvPr>
+            <p:cNvPicPr>
+              <a:picLocks noChangeAspect="1"/>
+            </p:cNvPicPr>
+            <p:nvPr/>
+          </p:nvPicPr>
+          <p:blipFill>
+            <a:blip r:embed="rId2"/>
+            <a:stretch>
+              <a:fillRect/>
+            </a:stretch>
+          </p:blipFill>
+          <p:spPr>
+            <a:xfrm>
+              <a:off x="1599572" y="458712"/>
+              <a:ext cx="8992855" cy="5496692"/>
+            </a:xfrm>
+            <a:prstGeom prst="rect">
+              <a:avLst/>
+            </a:prstGeom>
+          </p:spPr>
+        </p:pic>
+        <p:sp>
+          <p:nvSpPr>
+            <p:cNvPr id="3" name="Rectangle 2">
+              <a:extLst>
+                <a:ext uri="{FF2B5EF4-FFF2-40B4-BE49-F238E27FC236}">
+                  <a16:creationId xmlns:a16="http://schemas.microsoft.com/office/drawing/2014/main" id="{A97B8096-95A5-4673-9362-120E0B4559A5}"/>
+                </a:ext>
+              </a:extLst>
+            </p:cNvPr>
+            <p:cNvSpPr/>
+            <p:nvPr/>
+          </p:nvSpPr>
+          <p:spPr>
+            <a:xfrm>
+              <a:off x="9350677" y="1112770"/>
+              <a:ext cx="1151606" cy="420108"/>
+            </a:xfrm>
+            <a:prstGeom prst="rect">
+              <a:avLst/>
+            </a:prstGeom>
+            <a:noFill/>
+            <a:ln w="19050">
+              <a:solidFill>
+                <a:srgbClr val="FF0000"/>
+              </a:solidFill>
+            </a:ln>
+          </p:spPr>
+          <p:style>
+            <a:lnRef idx="2">
+              <a:schemeClr val="accent1">
+                <a:shade val="50000"/>
+              </a:schemeClr>
+            </a:lnRef>
+            <a:fillRef idx="1">
+              <a:schemeClr val="accent1"/>
+            </a:fillRef>
+            <a:effectRef idx="0">
+              <a:schemeClr val="accent1"/>
+            </a:effectRef>
+            <a:fontRef idx="minor">
+              <a:schemeClr val="lt1"/>
+            </a:fontRef>
+          </p:style>
+          <p:txBody>
+            <a:bodyPr rtlCol="0" anchor="ctr"/>
+            <a:lstStyle/>
+            <a:p>
+              <a:pPr algn="ctr"/>
+              <a:endParaRPr lang="es-CR"/>
+            </a:p>
+          </p:txBody>
+        </p:sp>
+        <p:cxnSp>
+          <p:nvCxnSpPr>
+            <p:cNvPr id="5" name="Straight Arrow Connector 4">
+              <a:extLst>
+                <a:ext uri="{FF2B5EF4-FFF2-40B4-BE49-F238E27FC236}">
+                  <a16:creationId xmlns:a16="http://schemas.microsoft.com/office/drawing/2014/main" id="{11D969BB-76D7-4041-AA0C-99E6425A9CB9}"/>
+                </a:ext>
+              </a:extLst>
+            </p:cNvPr>
+            <p:cNvCxnSpPr>
+              <a:stCxn id="3" idx="2"/>
+            </p:cNvCxnSpPr>
+            <p:nvPr/>
+          </p:nvCxnSpPr>
+          <p:spPr>
+            <a:xfrm flipH="1">
+              <a:off x="7537142" y="1532878"/>
+              <a:ext cx="2389338" cy="1778493"/>
+            </a:xfrm>
+            <a:prstGeom prst="straightConnector1">
+              <a:avLst/>
+            </a:prstGeom>
+            <a:ln w="28575">
+              <a:solidFill>
+                <a:srgbClr val="FF0000"/>
+              </a:solidFill>
+              <a:tailEnd type="triangle"/>
+            </a:ln>
+          </p:spPr>
+          <p:style>
+            <a:lnRef idx="1">
+              <a:schemeClr val="accent1"/>
+            </a:lnRef>
+            <a:fillRef idx="0">
+              <a:schemeClr val="accent1"/>
+            </a:fillRef>
+            <a:effectRef idx="0">
+              <a:schemeClr val="accent1"/>
+            </a:effectRef>
+            <a:fontRef idx="minor">
+              <a:schemeClr val="tx1"/>
+            </a:fontRef>
+          </p:style>
+        </p:cxnSp>
+      </p:grpSp>
     </p:spTree>
     <p:extLst>
       <p:ext uri="{BB962C8B-B14F-4D97-AF65-F5344CB8AC3E}">
@@ -4020,36 +4489,109 @@
           <a:chExt cx="0" cy="0"/>
         </a:xfrm>
       </p:grpSpPr>
-      <p:pic>
-        <p:nvPicPr>
-          <p:cNvPr id="2" name="Picture 1">
-            <a:extLst>
-              <a:ext uri="{FF2B5EF4-FFF2-40B4-BE49-F238E27FC236}">
-                <a16:creationId xmlns:a16="http://schemas.microsoft.com/office/drawing/2014/main" id="{A8919097-9F1A-4CD6-80D3-3EC53773BA92}"/>
-              </a:ext>
-            </a:extLst>
-          </p:cNvPr>
-          <p:cNvPicPr>
-            <a:picLocks noChangeAspect="1"/>
-          </p:cNvPicPr>
+      <p:grpSp>
+        <p:nvGrpSpPr>
+          <p:cNvPr id="4" name="Group 3">
+            <a:extLst>
+              <a:ext uri="{FF2B5EF4-FFF2-40B4-BE49-F238E27FC236}">
+                <a16:creationId xmlns:a16="http://schemas.microsoft.com/office/drawing/2014/main" id="{39D7A827-B474-4A5F-9C9A-E2D10EAF34FF}"/>
+              </a:ext>
+            </a:extLst>
+          </p:cNvPr>
+          <p:cNvGrpSpPr/>
           <p:nvPr/>
-        </p:nvPicPr>
-        <p:blipFill>
-          <a:blip r:embed="rId2"/>
-          <a:stretch>
-            <a:fillRect/>
-          </a:stretch>
-        </p:blipFill>
-        <p:spPr>
+        </p:nvGrpSpPr>
+        <p:grpSpPr>
           <a:xfrm>
             <a:off x="2947548" y="818785"/>
             <a:ext cx="6296904" cy="5220429"/>
+            <a:chOff x="2947548" y="818785"/>
+            <a:chExt cx="6296904" cy="5220429"/>
           </a:xfrm>
-          <a:prstGeom prst="rect">
-            <a:avLst/>
-          </a:prstGeom>
-        </p:spPr>
-      </p:pic>
+        </p:grpSpPr>
+        <p:pic>
+          <p:nvPicPr>
+            <p:cNvPr id="2" name="Picture 1">
+              <a:extLst>
+                <a:ext uri="{FF2B5EF4-FFF2-40B4-BE49-F238E27FC236}">
+                  <a16:creationId xmlns:a16="http://schemas.microsoft.com/office/drawing/2014/main" id="{A8919097-9F1A-4CD6-80D3-3EC53773BA92}"/>
+                </a:ext>
+              </a:extLst>
+            </p:cNvPr>
+            <p:cNvPicPr>
+              <a:picLocks noChangeAspect="1"/>
+            </p:cNvPicPr>
+            <p:nvPr/>
+          </p:nvPicPr>
+          <p:blipFill>
+            <a:blip r:embed="rId2"/>
+            <a:stretch>
+              <a:fillRect/>
+            </a:stretch>
+          </p:blipFill>
+          <p:spPr>
+            <a:xfrm>
+              <a:off x="2947548" y="818785"/>
+              <a:ext cx="6296904" cy="5220429"/>
+            </a:xfrm>
+            <a:prstGeom prst="rect">
+              <a:avLst/>
+            </a:prstGeom>
+          </p:spPr>
+        </p:pic>
+        <p:sp>
+          <p:nvSpPr>
+            <p:cNvPr id="3" name="Rectangle 2">
+              <a:extLst>
+                <a:ext uri="{FF2B5EF4-FFF2-40B4-BE49-F238E27FC236}">
+                  <a16:creationId xmlns:a16="http://schemas.microsoft.com/office/drawing/2014/main" id="{FCD6BAB6-A76C-4D23-9C7B-806FBA40E798}"/>
+                </a:ext>
+              </a:extLst>
+            </p:cNvPr>
+            <p:cNvSpPr/>
+            <p:nvPr/>
+          </p:nvSpPr>
+          <p:spPr>
+            <a:xfrm>
+              <a:off x="4565612" y="3092491"/>
+              <a:ext cx="2323459" cy="245513"/>
+            </a:xfrm>
+            <a:prstGeom prst="rect">
+              <a:avLst/>
+            </a:prstGeom>
+            <a:noFill/>
+            <a:ln w="19050">
+              <a:solidFill>
+                <a:srgbClr val="FF0000"/>
+              </a:solidFill>
+            </a:ln>
+          </p:spPr>
+          <p:style>
+            <a:lnRef idx="2">
+              <a:schemeClr val="accent1">
+                <a:shade val="50000"/>
+              </a:schemeClr>
+            </a:lnRef>
+            <a:fillRef idx="1">
+              <a:schemeClr val="accent1"/>
+            </a:fillRef>
+            <a:effectRef idx="0">
+              <a:schemeClr val="accent1"/>
+            </a:effectRef>
+            <a:fontRef idx="minor">
+              <a:schemeClr val="lt1"/>
+            </a:fontRef>
+          </p:style>
+          <p:txBody>
+            <a:bodyPr rtlCol="0" anchor="ctr"/>
+            <a:lstStyle/>
+            <a:p>
+              <a:pPr algn="ctr"/>
+              <a:endParaRPr lang="es-CR"/>
+            </a:p>
+          </p:txBody>
+        </p:sp>
+      </p:grpSp>
     </p:spTree>
     <p:extLst>
       <p:ext uri="{BB962C8B-B14F-4D97-AF65-F5344CB8AC3E}">
@@ -4080,35 +4622,111 @@
           <a:chExt cx="0" cy="0"/>
         </a:xfrm>
       </p:grpSpPr>
-      <p:pic>
-        <p:nvPicPr>
-          <p:cNvPr id="4" name="Picture 3">
-            <a:extLst>
-              <a:ext uri="{FF2B5EF4-FFF2-40B4-BE49-F238E27FC236}">
-                <a16:creationId xmlns:a16="http://schemas.microsoft.com/office/drawing/2014/main" id="{1EFAB695-9D8C-4123-9335-778CF545DA6E}"/>
-              </a:ext>
-            </a:extLst>
-          </p:cNvPr>
-          <p:cNvPicPr>
-            <a:picLocks noChangeAspect="1"/>
-          </p:cNvPicPr>
+      <p:grpSp>
+        <p:nvGrpSpPr>
+          <p:cNvPr id="8" name="Group 7">
+            <a:extLst>
+              <a:ext uri="{FF2B5EF4-FFF2-40B4-BE49-F238E27FC236}">
+                <a16:creationId xmlns:a16="http://schemas.microsoft.com/office/drawing/2014/main" id="{31293628-0ECF-422F-9D8F-B79730FB7179}"/>
+              </a:ext>
+            </a:extLst>
+          </p:cNvPr>
+          <p:cNvGrpSpPr/>
           <p:nvPr/>
-        </p:nvPicPr>
-        <p:blipFill rotWithShape="1">
-          <a:blip r:embed="rId2"/>
-          <a:srcRect l="164" t="436" b="436"/>
-          <a:stretch/>
-        </p:blipFill>
-        <p:spPr>
+        </p:nvGrpSpPr>
+        <p:grpSpPr>
           <a:xfrm>
-            <a:off x="1133475" y="542925"/>
+            <a:off x="1289783" y="739295"/>
             <a:ext cx="9044619" cy="5505450"/>
+            <a:chOff x="1387437" y="1422876"/>
+            <a:chExt cx="9044619" cy="5505450"/>
           </a:xfrm>
-          <a:prstGeom prst="rect">
-            <a:avLst/>
-          </a:prstGeom>
-        </p:spPr>
-      </p:pic>
+        </p:grpSpPr>
+        <p:pic>
+          <p:nvPicPr>
+            <p:cNvPr id="4" name="Picture 3">
+              <a:extLst>
+                <a:ext uri="{FF2B5EF4-FFF2-40B4-BE49-F238E27FC236}">
+                  <a16:creationId xmlns:a16="http://schemas.microsoft.com/office/drawing/2014/main" id="{1EFAB695-9D8C-4123-9335-778CF545DA6E}"/>
+                </a:ext>
+              </a:extLst>
+            </p:cNvPr>
+            <p:cNvPicPr>
+              <a:picLocks noChangeAspect="1"/>
+            </p:cNvPicPr>
+            <p:nvPr/>
+          </p:nvPicPr>
+          <p:blipFill rotWithShape="1">
+            <a:blip r:embed="rId2"/>
+            <a:srcRect l="164" t="436" b="436"/>
+            <a:stretch/>
+          </p:blipFill>
+          <p:spPr>
+            <a:xfrm>
+              <a:off x="1387437" y="1422876"/>
+              <a:ext cx="9044619" cy="5505450"/>
+            </a:xfrm>
+            <a:prstGeom prst="rect">
+              <a:avLst/>
+            </a:prstGeom>
+            <a:ln>
+              <a:noFill/>
+            </a:ln>
+          </p:spPr>
+        </p:pic>
+        <p:sp>
+          <p:nvSpPr>
+            <p:cNvPr id="7" name="Rectangle 6">
+              <a:extLst>
+                <a:ext uri="{FF2B5EF4-FFF2-40B4-BE49-F238E27FC236}">
+                  <a16:creationId xmlns:a16="http://schemas.microsoft.com/office/drawing/2014/main" id="{AD390812-146A-4BA3-8915-824873700C9A}"/>
+                </a:ext>
+              </a:extLst>
+            </p:cNvPr>
+            <p:cNvSpPr/>
+            <p:nvPr/>
+          </p:nvSpPr>
+          <p:spPr>
+            <a:xfrm>
+              <a:off x="1387437" y="1708393"/>
+              <a:ext cx="9044619" cy="200305"/>
+            </a:xfrm>
+            <a:prstGeom prst="rect">
+              <a:avLst/>
+            </a:prstGeom>
+            <a:noFill/>
+            <a:ln w="19050">
+              <a:solidFill>
+                <a:srgbClr val="FF0000"/>
+              </a:solidFill>
+            </a:ln>
+          </p:spPr>
+          <p:style>
+            <a:lnRef idx="2">
+              <a:schemeClr val="accent1">
+                <a:shade val="50000"/>
+              </a:schemeClr>
+            </a:lnRef>
+            <a:fillRef idx="1">
+              <a:schemeClr val="accent1"/>
+            </a:fillRef>
+            <a:effectRef idx="0">
+              <a:schemeClr val="accent1"/>
+            </a:effectRef>
+            <a:fontRef idx="minor">
+              <a:schemeClr val="lt1"/>
+            </a:fontRef>
+          </p:style>
+          <p:txBody>
+            <a:bodyPr rtlCol="0" anchor="ctr"/>
+            <a:lstStyle/>
+            <a:p>
+              <a:pPr algn="ctr"/>
+              <a:endParaRPr lang="es-CR"/>
+            </a:p>
+          </p:txBody>
+        </p:sp>
+      </p:grpSp>
     </p:spTree>
     <p:extLst>
       <p:ext uri="{BB962C8B-B14F-4D97-AF65-F5344CB8AC3E}">
@@ -4731,35 +5349,212 @@
           <a:chExt cx="0" cy="0"/>
         </a:xfrm>
       </p:grpSpPr>
-      <p:pic>
-        <p:nvPicPr>
-          <p:cNvPr id="5" name="Picture 4">
-            <a:extLst>
-              <a:ext uri="{FF2B5EF4-FFF2-40B4-BE49-F238E27FC236}">
-                <a16:creationId xmlns:a16="http://schemas.microsoft.com/office/drawing/2014/main" id="{DC2AA419-7373-4987-A543-784A21CBA5EA}"/>
-              </a:ext>
-            </a:extLst>
-          </p:cNvPr>
-          <p:cNvPicPr>
-            <a:picLocks noChangeAspect="1"/>
-          </p:cNvPicPr>
+      <p:grpSp>
+        <p:nvGrpSpPr>
+          <p:cNvPr id="10" name="Group 9">
+            <a:extLst>
+              <a:ext uri="{FF2B5EF4-FFF2-40B4-BE49-F238E27FC236}">
+                <a16:creationId xmlns:a16="http://schemas.microsoft.com/office/drawing/2014/main" id="{EA9BC75F-D6A6-4416-9557-5BD5D31B2CA8}"/>
+              </a:ext>
+            </a:extLst>
+          </p:cNvPr>
+          <p:cNvGrpSpPr/>
           <p:nvPr/>
-        </p:nvPicPr>
-        <p:blipFill rotWithShape="1">
-          <a:blip r:embed="rId2"/>
-          <a:srcRect l="539" t="446"/>
-          <a:stretch/>
-        </p:blipFill>
-        <p:spPr>
+        </p:nvGrpSpPr>
+        <p:grpSpPr>
           <a:xfrm>
-            <a:off x="1615044" y="676893"/>
+            <a:off x="1387437" y="856646"/>
             <a:ext cx="9010725" cy="5529031"/>
+            <a:chOff x="1387437" y="856646"/>
+            <a:chExt cx="9010725" cy="5529031"/>
           </a:xfrm>
-          <a:prstGeom prst="rect">
-            <a:avLst/>
-          </a:prstGeom>
-        </p:spPr>
-      </p:pic>
+        </p:grpSpPr>
+        <p:pic>
+          <p:nvPicPr>
+            <p:cNvPr id="5" name="Picture 4">
+              <a:extLst>
+                <a:ext uri="{FF2B5EF4-FFF2-40B4-BE49-F238E27FC236}">
+                  <a16:creationId xmlns:a16="http://schemas.microsoft.com/office/drawing/2014/main" id="{DC2AA419-7373-4987-A543-784A21CBA5EA}"/>
+                </a:ext>
+              </a:extLst>
+            </p:cNvPr>
+            <p:cNvPicPr>
+              <a:picLocks noChangeAspect="1"/>
+            </p:cNvPicPr>
+            <p:nvPr/>
+          </p:nvPicPr>
+          <p:blipFill rotWithShape="1">
+            <a:blip r:embed="rId2"/>
+            <a:srcRect l="539" t="446"/>
+            <a:stretch/>
+          </p:blipFill>
+          <p:spPr>
+            <a:xfrm>
+              <a:off x="1387437" y="856646"/>
+              <a:ext cx="9010725" cy="5529031"/>
+            </a:xfrm>
+            <a:prstGeom prst="rect">
+              <a:avLst/>
+            </a:prstGeom>
+          </p:spPr>
+        </p:pic>
+        <p:sp>
+          <p:nvSpPr>
+            <p:cNvPr id="3" name="Rectangle 2">
+              <a:extLst>
+                <a:ext uri="{FF2B5EF4-FFF2-40B4-BE49-F238E27FC236}">
+                  <a16:creationId xmlns:a16="http://schemas.microsoft.com/office/drawing/2014/main" id="{73A271DE-92DD-484D-8AD5-60E6C6AC6C5A}"/>
+                </a:ext>
+              </a:extLst>
+            </p:cNvPr>
+            <p:cNvSpPr/>
+            <p:nvPr/>
+          </p:nvSpPr>
+          <p:spPr>
+            <a:xfrm>
+              <a:off x="1387437" y="1530841"/>
+              <a:ext cx="1292279" cy="198560"/>
+            </a:xfrm>
+            <a:prstGeom prst="rect">
+              <a:avLst/>
+            </a:prstGeom>
+            <a:noFill/>
+            <a:ln w="19050">
+              <a:solidFill>
+                <a:srgbClr val="FF0000"/>
+              </a:solidFill>
+            </a:ln>
+          </p:spPr>
+          <p:style>
+            <a:lnRef idx="2">
+              <a:schemeClr val="accent1">
+                <a:shade val="50000"/>
+              </a:schemeClr>
+            </a:lnRef>
+            <a:fillRef idx="1">
+              <a:schemeClr val="accent1"/>
+            </a:fillRef>
+            <a:effectRef idx="0">
+              <a:schemeClr val="accent1"/>
+            </a:effectRef>
+            <a:fontRef idx="minor">
+              <a:schemeClr val="lt1"/>
+            </a:fontRef>
+          </p:style>
+          <p:txBody>
+            <a:bodyPr rtlCol="0" anchor="ctr"/>
+            <a:lstStyle/>
+            <a:p>
+              <a:pPr algn="ctr"/>
+              <a:endParaRPr lang="es-CR"/>
+            </a:p>
+          </p:txBody>
+        </p:sp>
+        <p:sp>
+          <p:nvSpPr>
+            <p:cNvPr id="8" name="Rectangle 7">
+              <a:extLst>
+                <a:ext uri="{FF2B5EF4-FFF2-40B4-BE49-F238E27FC236}">
+                  <a16:creationId xmlns:a16="http://schemas.microsoft.com/office/drawing/2014/main" id="{DCAF9948-38F3-4FF2-B454-137C53C60A2B}"/>
+                </a:ext>
+              </a:extLst>
+            </p:cNvPr>
+            <p:cNvSpPr/>
+            <p:nvPr/>
+          </p:nvSpPr>
+          <p:spPr>
+            <a:xfrm>
+              <a:off x="1387437" y="1530841"/>
+              <a:ext cx="5625922" cy="4195255"/>
+            </a:xfrm>
+            <a:prstGeom prst="rect">
+              <a:avLst/>
+            </a:prstGeom>
+            <a:noFill/>
+            <a:ln w="19050">
+              <a:solidFill>
+                <a:srgbClr val="FF0000"/>
+              </a:solidFill>
+            </a:ln>
+          </p:spPr>
+          <p:style>
+            <a:lnRef idx="2">
+              <a:schemeClr val="accent1">
+                <a:shade val="50000"/>
+              </a:schemeClr>
+            </a:lnRef>
+            <a:fillRef idx="1">
+              <a:schemeClr val="accent1"/>
+            </a:fillRef>
+            <a:effectRef idx="0">
+              <a:schemeClr val="accent1"/>
+            </a:effectRef>
+            <a:fontRef idx="minor">
+              <a:schemeClr val="lt1"/>
+            </a:fontRef>
+          </p:style>
+          <p:txBody>
+            <a:bodyPr rtlCol="0" anchor="ctr"/>
+            <a:lstStyle/>
+            <a:p>
+              <a:pPr algn="ctr"/>
+              <a:endParaRPr lang="es-CR"/>
+            </a:p>
+          </p:txBody>
+        </p:sp>
+        <p:sp>
+          <p:nvSpPr>
+            <p:cNvPr id="9" name="Rectangle 8">
+              <a:extLst>
+                <a:ext uri="{FF2B5EF4-FFF2-40B4-BE49-F238E27FC236}">
+                  <a16:creationId xmlns:a16="http://schemas.microsoft.com/office/drawing/2014/main" id="{89F6DC35-94B1-4A92-8155-954B1E24513F}"/>
+                </a:ext>
+              </a:extLst>
+            </p:cNvPr>
+            <p:cNvSpPr/>
+            <p:nvPr/>
+          </p:nvSpPr>
+          <p:spPr>
+            <a:xfrm>
+              <a:off x="7115014" y="1530840"/>
+              <a:ext cx="1957965" cy="4195255"/>
+            </a:xfrm>
+            <a:prstGeom prst="rect">
+              <a:avLst/>
+            </a:prstGeom>
+            <a:noFill/>
+            <a:ln w="19050">
+              <a:solidFill>
+                <a:srgbClr val="FF0000"/>
+              </a:solidFill>
+            </a:ln>
+          </p:spPr>
+          <p:style>
+            <a:lnRef idx="2">
+              <a:schemeClr val="accent1">
+                <a:shade val="50000"/>
+              </a:schemeClr>
+            </a:lnRef>
+            <a:fillRef idx="1">
+              <a:schemeClr val="accent1"/>
+            </a:fillRef>
+            <a:effectRef idx="0">
+              <a:schemeClr val="accent1"/>
+            </a:effectRef>
+            <a:fontRef idx="minor">
+              <a:schemeClr val="lt1"/>
+            </a:fontRef>
+          </p:style>
+          <p:txBody>
+            <a:bodyPr rtlCol="0" anchor="ctr"/>
+            <a:lstStyle/>
+            <a:p>
+              <a:pPr algn="ctr"/>
+              <a:endParaRPr lang="es-CR"/>
+            </a:p>
+          </p:txBody>
+        </p:sp>
+      </p:grpSp>
     </p:spTree>
     <p:extLst>
       <p:ext uri="{BB962C8B-B14F-4D97-AF65-F5344CB8AC3E}">
@@ -4811,7 +5606,7 @@
         </p:blipFill>
         <p:spPr>
           <a:xfrm>
-            <a:off x="1603169" y="688769"/>
+            <a:off x="1584700" y="670422"/>
             <a:ext cx="9022600" cy="5517156"/>
           </a:xfrm>
           <a:prstGeom prst="rect">
@@ -4819,6 +5614,58 @@
           </a:prstGeom>
         </p:spPr>
       </p:pic>
+      <p:sp>
+        <p:nvSpPr>
+          <p:cNvPr id="3" name="Rectangle 2">
+            <a:extLst>
+              <a:ext uri="{FF2B5EF4-FFF2-40B4-BE49-F238E27FC236}">
+                <a16:creationId xmlns:a16="http://schemas.microsoft.com/office/drawing/2014/main" id="{E5AD6514-EC9E-468A-A00F-EC57EED81E9D}"/>
+              </a:ext>
+            </a:extLst>
+          </p:cNvPr>
+          <p:cNvSpPr/>
+          <p:nvPr/>
+        </p:nvSpPr>
+        <p:spPr>
+          <a:xfrm>
+            <a:off x="2181768" y="1330538"/>
+            <a:ext cx="1363578" cy="206376"/>
+          </a:xfrm>
+          <a:prstGeom prst="rect">
+            <a:avLst/>
+          </a:prstGeom>
+          <a:noFill/>
+          <a:ln w="19050">
+            <a:solidFill>
+              <a:srgbClr val="FF0000"/>
+            </a:solidFill>
+          </a:ln>
+        </p:spPr>
+        <p:style>
+          <a:lnRef idx="2">
+            <a:schemeClr val="accent1">
+              <a:shade val="50000"/>
+            </a:schemeClr>
+          </a:lnRef>
+          <a:fillRef idx="1">
+            <a:schemeClr val="accent1"/>
+          </a:fillRef>
+          <a:effectRef idx="0">
+            <a:schemeClr val="accent1"/>
+          </a:effectRef>
+          <a:fontRef idx="minor">
+            <a:schemeClr val="lt1"/>
+          </a:fontRef>
+        </p:style>
+        <p:txBody>
+          <a:bodyPr rtlCol="0" anchor="ctr"/>
+          <a:lstStyle/>
+          <a:p>
+            <a:pPr algn="ctr"/>
+            <a:endParaRPr lang="es-CR"/>
+          </a:p>
+        </p:txBody>
+      </p:sp>
     </p:spTree>
     <p:extLst>
       <p:ext uri="{BB962C8B-B14F-4D97-AF65-F5344CB8AC3E}">
@@ -4909,36 +5756,153 @@
           <a:chExt cx="0" cy="0"/>
         </a:xfrm>
       </p:grpSpPr>
-      <p:pic>
-        <p:nvPicPr>
-          <p:cNvPr id="4" name="Picture 3">
-            <a:extLst>
-              <a:ext uri="{FF2B5EF4-FFF2-40B4-BE49-F238E27FC236}">
-                <a16:creationId xmlns:a16="http://schemas.microsoft.com/office/drawing/2014/main" id="{A7FA744E-4F44-4AEE-82F8-108B61836593}"/>
-              </a:ext>
-            </a:extLst>
-          </p:cNvPr>
-          <p:cNvPicPr>
-            <a:picLocks noChangeAspect="1"/>
-          </p:cNvPicPr>
+      <p:grpSp>
+        <p:nvGrpSpPr>
+          <p:cNvPr id="7" name="Group 6">
+            <a:extLst>
+              <a:ext uri="{FF2B5EF4-FFF2-40B4-BE49-F238E27FC236}">
+                <a16:creationId xmlns:a16="http://schemas.microsoft.com/office/drawing/2014/main" id="{17D1AFFD-58A7-47CA-9FD3-C9D205EA5D27}"/>
+              </a:ext>
+            </a:extLst>
+          </p:cNvPr>
+          <p:cNvGrpSpPr/>
           <p:nvPr/>
-        </p:nvPicPr>
-        <p:blipFill>
-          <a:blip r:embed="rId2"/>
-          <a:stretch>
-            <a:fillRect/>
-          </a:stretch>
-        </p:blipFill>
-        <p:spPr>
+        </p:nvGrpSpPr>
+        <p:grpSpPr>
           <a:xfrm>
-            <a:off x="1585283" y="680654"/>
+            <a:off x="1366452" y="618131"/>
             <a:ext cx="9021434" cy="5496692"/>
+            <a:chOff x="1366452" y="618131"/>
+            <a:chExt cx="9021434" cy="5496692"/>
           </a:xfrm>
-          <a:prstGeom prst="rect">
-            <a:avLst/>
-          </a:prstGeom>
-        </p:spPr>
-      </p:pic>
+        </p:grpSpPr>
+        <p:pic>
+          <p:nvPicPr>
+            <p:cNvPr id="4" name="Picture 3">
+              <a:extLst>
+                <a:ext uri="{FF2B5EF4-FFF2-40B4-BE49-F238E27FC236}">
+                  <a16:creationId xmlns:a16="http://schemas.microsoft.com/office/drawing/2014/main" id="{A7FA744E-4F44-4AEE-82F8-108B61836593}"/>
+                </a:ext>
+              </a:extLst>
+            </p:cNvPr>
+            <p:cNvPicPr>
+              <a:picLocks noChangeAspect="1"/>
+            </p:cNvPicPr>
+            <p:nvPr/>
+          </p:nvPicPr>
+          <p:blipFill>
+            <a:blip r:embed="rId2"/>
+            <a:stretch>
+              <a:fillRect/>
+            </a:stretch>
+          </p:blipFill>
+          <p:spPr>
+            <a:xfrm>
+              <a:off x="1366452" y="618131"/>
+              <a:ext cx="9021434" cy="5496692"/>
+            </a:xfrm>
+            <a:prstGeom prst="rect">
+              <a:avLst/>
+            </a:prstGeom>
+          </p:spPr>
+        </p:pic>
+        <p:sp>
+          <p:nvSpPr>
+            <p:cNvPr id="3" name="Rectangle 2">
+              <a:extLst>
+                <a:ext uri="{FF2B5EF4-FFF2-40B4-BE49-F238E27FC236}">
+                  <a16:creationId xmlns:a16="http://schemas.microsoft.com/office/drawing/2014/main" id="{39496B5F-C23F-4397-B458-80409EC0A238}"/>
+                </a:ext>
+              </a:extLst>
+            </p:cNvPr>
+            <p:cNvSpPr/>
+            <p:nvPr/>
+          </p:nvSpPr>
+          <p:spPr>
+            <a:xfrm>
+              <a:off x="4932784" y="5597738"/>
+              <a:ext cx="1045985" cy="427924"/>
+            </a:xfrm>
+            <a:prstGeom prst="rect">
+              <a:avLst/>
+            </a:prstGeom>
+            <a:noFill/>
+            <a:ln w="19050">
+              <a:solidFill>
+                <a:srgbClr val="FF0000"/>
+              </a:solidFill>
+            </a:ln>
+          </p:spPr>
+          <p:style>
+            <a:lnRef idx="2">
+              <a:schemeClr val="accent1">
+                <a:shade val="50000"/>
+              </a:schemeClr>
+            </a:lnRef>
+            <a:fillRef idx="1">
+              <a:schemeClr val="accent1"/>
+            </a:fillRef>
+            <a:effectRef idx="0">
+              <a:schemeClr val="accent1"/>
+            </a:effectRef>
+            <a:fontRef idx="minor">
+              <a:schemeClr val="lt1"/>
+            </a:fontRef>
+          </p:style>
+          <p:txBody>
+            <a:bodyPr rtlCol="0" anchor="ctr"/>
+            <a:lstStyle/>
+            <a:p>
+              <a:pPr algn="ctr"/>
+              <a:endParaRPr lang="es-CR"/>
+            </a:p>
+          </p:txBody>
+        </p:sp>
+        <p:cxnSp>
+          <p:nvCxnSpPr>
+            <p:cNvPr id="5" name="Straight Arrow Connector 4">
+              <a:extLst>
+                <a:ext uri="{FF2B5EF4-FFF2-40B4-BE49-F238E27FC236}">
+                  <a16:creationId xmlns:a16="http://schemas.microsoft.com/office/drawing/2014/main" id="{14B28173-443D-43D0-A9EB-CA8C21515737}"/>
+                </a:ext>
+              </a:extLst>
+            </p:cNvPr>
+            <p:cNvCxnSpPr>
+              <a:cxnSpLocks/>
+            </p:cNvCxnSpPr>
+            <p:nvPr/>
+          </p:nvCxnSpPr>
+          <p:spPr>
+            <a:xfrm flipV="1">
+              <a:off x="5455138" y="5017478"/>
+              <a:ext cx="0" cy="580260"/>
+            </a:xfrm>
+            <a:prstGeom prst="straightConnector1">
+              <a:avLst/>
+            </a:prstGeom>
+            <a:ln w="28575">
+              <a:solidFill>
+                <a:srgbClr val="FF0000"/>
+              </a:solidFill>
+              <a:tailEnd type="triangle"/>
+            </a:ln>
+          </p:spPr>
+          <p:style>
+            <a:lnRef idx="1">
+              <a:schemeClr val="accent1"/>
+            </a:lnRef>
+            <a:fillRef idx="0">
+              <a:schemeClr val="accent1"/>
+            </a:fillRef>
+            <a:effectRef idx="0">
+              <a:schemeClr val="accent1"/>
+            </a:effectRef>
+            <a:fontRef idx="minor">
+              <a:schemeClr val="tx1"/>
+            </a:fontRef>
+          </p:style>
+        </p:cxnSp>
+      </p:grpSp>
     </p:spTree>
     <p:extLst>
       <p:ext uri="{BB962C8B-B14F-4D97-AF65-F5344CB8AC3E}">
@@ -5125,6 +6089,102 @@
           </a:prstGeom>
         </p:spPr>
       </p:pic>
+      <p:sp>
+        <p:nvSpPr>
+          <p:cNvPr id="3" name="Rectangle 2">
+            <a:extLst>
+              <a:ext uri="{FF2B5EF4-FFF2-40B4-BE49-F238E27FC236}">
+                <a16:creationId xmlns:a16="http://schemas.microsoft.com/office/drawing/2014/main" id="{274F705E-B150-4D6D-857D-8F3A6452CE58}"/>
+              </a:ext>
+            </a:extLst>
+          </p:cNvPr>
+          <p:cNvSpPr/>
+          <p:nvPr/>
+        </p:nvSpPr>
+        <p:spPr>
+          <a:xfrm>
+            <a:off x="7699430" y="5675892"/>
+            <a:ext cx="850601" cy="420108"/>
+          </a:xfrm>
+          <a:prstGeom prst="rect">
+            <a:avLst/>
+          </a:prstGeom>
+          <a:noFill/>
+          <a:ln w="19050">
+            <a:solidFill>
+              <a:srgbClr val="FF0000"/>
+            </a:solidFill>
+          </a:ln>
+        </p:spPr>
+        <p:style>
+          <a:lnRef idx="2">
+            <a:schemeClr val="accent1">
+              <a:shade val="50000"/>
+            </a:schemeClr>
+          </a:lnRef>
+          <a:fillRef idx="1">
+            <a:schemeClr val="accent1"/>
+          </a:fillRef>
+          <a:effectRef idx="0">
+            <a:schemeClr val="accent1"/>
+          </a:effectRef>
+          <a:fontRef idx="minor">
+            <a:schemeClr val="lt1"/>
+          </a:fontRef>
+        </p:style>
+        <p:txBody>
+          <a:bodyPr rtlCol="0" anchor="ctr"/>
+          <a:lstStyle/>
+          <a:p>
+            <a:pPr algn="ctr"/>
+            <a:endParaRPr lang="es-CR"/>
+          </a:p>
+        </p:txBody>
+      </p:sp>
+      <p:cxnSp>
+        <p:nvCxnSpPr>
+          <p:cNvPr id="5" name="Straight Arrow Connector 4">
+            <a:extLst>
+              <a:ext uri="{FF2B5EF4-FFF2-40B4-BE49-F238E27FC236}">
+                <a16:creationId xmlns:a16="http://schemas.microsoft.com/office/drawing/2014/main" id="{317C7972-1DA0-45AD-BE53-F6EF37AC0307}"/>
+              </a:ext>
+            </a:extLst>
+          </p:cNvPr>
+          <p:cNvCxnSpPr>
+            <a:stCxn id="3" idx="0"/>
+          </p:cNvCxnSpPr>
+          <p:nvPr/>
+        </p:nvCxnSpPr>
+        <p:spPr>
+          <a:xfrm flipH="1" flipV="1">
+            <a:off x="7267699" y="4797631"/>
+            <a:ext cx="857032" cy="878261"/>
+          </a:xfrm>
+          <a:prstGeom prst="straightConnector1">
+            <a:avLst/>
+          </a:prstGeom>
+          <a:ln w="28575">
+            <a:solidFill>
+              <a:srgbClr val="FF0000"/>
+            </a:solidFill>
+            <a:tailEnd type="triangle"/>
+          </a:ln>
+        </p:spPr>
+        <p:style>
+          <a:lnRef idx="1">
+            <a:schemeClr val="accent1"/>
+          </a:lnRef>
+          <a:fillRef idx="0">
+            <a:schemeClr val="accent1"/>
+          </a:fillRef>
+          <a:effectRef idx="0">
+            <a:schemeClr val="accent1"/>
+          </a:effectRef>
+          <a:fontRef idx="minor">
+            <a:schemeClr val="tx1"/>
+          </a:fontRef>
+        </p:style>
+      </p:cxnSp>
     </p:spTree>
     <p:extLst>
       <p:ext uri="{BB962C8B-B14F-4D97-AF65-F5344CB8AC3E}">

</xml_diff>